<commit_message>
update workshop document for filters.
</commit_message>
<xml_diff>
--- a/Servlets/Web Presentation-Part2.pptx
+++ b/Servlets/Web Presentation-Part2.pptx
@@ -641,6 +641,213 @@
           <a:bodyPr/>
           <a:lstStyle/>
           <a:p>
+            <a:r>
+              <a:rPr lang="en-US" sz="1200" b="0" i="0" kern="1200" dirty="0" smtClean="0">
+                <a:solidFill>
+                  <a:schemeClr val="tx1"/>
+                </a:solidFill>
+                <a:effectLst/>
+                <a:latin typeface="+mn-lt"/>
+                <a:ea typeface="+mn-ea"/>
+                <a:cs typeface="+mn-cs"/>
+              </a:rPr>
+              <a:t>Filters are defined and then mapped to a URL or Servlet, in much the same was as Servlet is defined and then mapped to a URL pattern.</a:t>
+            </a:r>
+          </a:p>
+          <a:p>
+            <a:endParaRPr lang="en-US" sz="1200" b="0" i="0" kern="1200" dirty="0" smtClean="0">
+              <a:solidFill>
+                <a:schemeClr val="tx1"/>
+              </a:solidFill>
+              <a:effectLst/>
+              <a:latin typeface="+mn-lt"/>
+              <a:ea typeface="+mn-ea"/>
+              <a:cs typeface="+mn-cs"/>
+            </a:endParaRPr>
+          </a:p>
+          <a:p>
+            <a:r>
+              <a:rPr lang="en-US" sz="1200" b="0" i="0" kern="1200" dirty="0" smtClean="0">
+                <a:solidFill>
+                  <a:schemeClr val="tx1"/>
+                </a:solidFill>
+                <a:effectLst/>
+                <a:latin typeface="+mn-lt"/>
+                <a:ea typeface="+mn-ea"/>
+                <a:cs typeface="+mn-cs"/>
+              </a:rPr>
+              <a:t>The order in which they are defined matters. The container will execute the filters in the order in which they are defined.</a:t>
+            </a:r>
+            <a:endParaRPr lang="en-US" dirty="0"/>
+          </a:p>
+        </p:txBody>
+      </p:sp>
+      <p:sp>
+        <p:nvSpPr>
+          <p:cNvPr id="4" name="Slide Number Placeholder 3"/>
+          <p:cNvSpPr>
+            <a:spLocks noGrp="1"/>
+          </p:cNvSpPr>
+          <p:nvPr>
+            <p:ph type="sldNum" sz="quarter" idx="10"/>
+          </p:nvPr>
+        </p:nvSpPr>
+        <p:spPr/>
+        <p:txBody>
+          <a:bodyPr/>
+          <a:lstStyle/>
+          <a:p>
+            <a:fld id="{84377D70-F193-4353-836F-31B604DF4B77}" type="slidenum">
+              <a:rPr lang="en-US" smtClean="0"/>
+              <a:pPr/>
+              <a:t>22</a:t>
+            </a:fld>
+            <a:endParaRPr lang="en-US"/>
+          </a:p>
+        </p:txBody>
+      </p:sp>
+    </p:spTree>
+    <p:extLst>
+      <p:ext uri="{BB962C8B-B14F-4D97-AF65-F5344CB8AC3E}">
+        <p14:creationId xmlns:p14="http://schemas.microsoft.com/office/powerpoint/2010/main" val="2998533791"/>
+      </p:ext>
+    </p:extLst>
+  </p:cSld>
+  <p:clrMapOvr>
+    <a:masterClrMapping/>
+  </p:clrMapOvr>
+</p:notes>
+</file>
+
+<file path=ppt/notesSlides/notesSlide11.xml><?xml version="1.0" encoding="utf-8"?>
+<p:notes xmlns:a="http://schemas.openxmlformats.org/drawingml/2006/main" xmlns:r="http://schemas.openxmlformats.org/officeDocument/2006/relationships" xmlns:p="http://schemas.openxmlformats.org/presentationml/2006/main">
+  <p:cSld>
+    <p:spTree>
+      <p:nvGrpSpPr>
+        <p:cNvPr id="1" name=""/>
+        <p:cNvGrpSpPr/>
+        <p:nvPr/>
+      </p:nvGrpSpPr>
+      <p:grpSpPr>
+        <a:xfrm>
+          <a:off x="0" y="0"/>
+          <a:ext cx="0" cy="0"/>
+          <a:chOff x="0" y="0"/>
+          <a:chExt cx="0" cy="0"/>
+        </a:xfrm>
+      </p:grpSpPr>
+      <p:sp>
+        <p:nvSpPr>
+          <p:cNvPr id="2" name="Slide Image Placeholder 1"/>
+          <p:cNvSpPr>
+            <a:spLocks noGrp="1" noRot="1" noChangeAspect="1"/>
+          </p:cNvSpPr>
+          <p:nvPr>
+            <p:ph type="sldImg"/>
+          </p:nvPr>
+        </p:nvSpPr>
+        <p:spPr/>
+      </p:sp>
+      <p:sp>
+        <p:nvSpPr>
+          <p:cNvPr id="3" name="Notes Placeholder 2"/>
+          <p:cNvSpPr>
+            <a:spLocks noGrp="1"/>
+          </p:cNvSpPr>
+          <p:nvPr>
+            <p:ph type="body" idx="1"/>
+          </p:nvPr>
+        </p:nvSpPr>
+        <p:spPr/>
+        <p:txBody>
+          <a:bodyPr/>
+          <a:lstStyle/>
+          <a:p>
+            <a:endParaRPr lang="ro-RO" dirty="0"/>
+          </a:p>
+        </p:txBody>
+      </p:sp>
+      <p:sp>
+        <p:nvSpPr>
+          <p:cNvPr id="4" name="Slide Number Placeholder 3"/>
+          <p:cNvSpPr>
+            <a:spLocks noGrp="1"/>
+          </p:cNvSpPr>
+          <p:nvPr>
+            <p:ph type="sldNum" sz="quarter" idx="10"/>
+          </p:nvPr>
+        </p:nvSpPr>
+        <p:spPr/>
+        <p:txBody>
+          <a:bodyPr/>
+          <a:lstStyle/>
+          <a:p>
+            <a:fld id="{84377D70-F193-4353-836F-31B604DF4B77}" type="slidenum">
+              <a:rPr lang="en-US" smtClean="0"/>
+              <a:pPr/>
+              <a:t>23</a:t>
+            </a:fld>
+            <a:endParaRPr lang="en-US"/>
+          </a:p>
+        </p:txBody>
+      </p:sp>
+    </p:spTree>
+    <p:extLst>
+      <p:ext uri="{BB962C8B-B14F-4D97-AF65-F5344CB8AC3E}">
+        <p14:creationId xmlns:p14="http://schemas.microsoft.com/office/powerpoint/2010/main" val="3194539832"/>
+      </p:ext>
+    </p:extLst>
+  </p:cSld>
+  <p:clrMapOvr>
+    <a:masterClrMapping/>
+  </p:clrMapOvr>
+</p:notes>
+</file>
+
+<file path=ppt/notesSlides/notesSlide12.xml><?xml version="1.0" encoding="utf-8"?>
+<p:notes xmlns:a="http://schemas.openxmlformats.org/drawingml/2006/main" xmlns:r="http://schemas.openxmlformats.org/officeDocument/2006/relationships" xmlns:p="http://schemas.openxmlformats.org/presentationml/2006/main">
+  <p:cSld>
+    <p:spTree>
+      <p:nvGrpSpPr>
+        <p:cNvPr id="1" name=""/>
+        <p:cNvGrpSpPr/>
+        <p:nvPr/>
+      </p:nvGrpSpPr>
+      <p:grpSpPr>
+        <a:xfrm>
+          <a:off x="0" y="0"/>
+          <a:ext cx="0" cy="0"/>
+          <a:chOff x="0" y="0"/>
+          <a:chExt cx="0" cy="0"/>
+        </a:xfrm>
+      </p:grpSpPr>
+      <p:sp>
+        <p:nvSpPr>
+          <p:cNvPr id="2" name="Slide Image Placeholder 1"/>
+          <p:cNvSpPr>
+            <a:spLocks noGrp="1" noRot="1" noChangeAspect="1"/>
+          </p:cNvSpPr>
+          <p:nvPr>
+            <p:ph type="sldImg"/>
+          </p:nvPr>
+        </p:nvSpPr>
+        <p:spPr/>
+      </p:sp>
+      <p:sp>
+        <p:nvSpPr>
+          <p:cNvPr id="3" name="Notes Placeholder 2"/>
+          <p:cNvSpPr>
+            <a:spLocks noGrp="1"/>
+          </p:cNvSpPr>
+          <p:nvPr>
+            <p:ph type="body" idx="1"/>
+          </p:nvPr>
+        </p:nvSpPr>
+        <p:spPr/>
+        <p:txBody>
+          <a:bodyPr/>
+          <a:lstStyle/>
+          <a:p>
             <a:endParaRPr lang="ro-RO" dirty="0"/>
           </a:p>
         </p:txBody>
@@ -1631,6 +1838,18 @@
           <a:bodyPr/>
           <a:lstStyle/>
           <a:p>
+            <a:r>
+              <a:rPr lang="en-US" sz="1200" b="0" i="0" kern="1200" dirty="0" smtClean="0">
+                <a:solidFill>
+                  <a:schemeClr val="tx1"/>
+                </a:solidFill>
+                <a:effectLst/>
+                <a:latin typeface="+mn-lt"/>
+                <a:ea typeface="+mn-ea"/>
+                <a:cs typeface="+mn-cs"/>
+              </a:rPr>
+              <a:t>Filters are defined and then mapped to a URL or Servlet, in much the same was as Servlet is defined and then mapped to a URL pattern.</a:t>
+            </a:r>
             <a:endParaRPr lang="en-US" dirty="0"/>
           </a:p>
         </p:txBody>
@@ -1653,7 +1872,7 @@
             <a:fld id="{84377D70-F193-4353-836F-31B604DF4B77}" type="slidenum">
               <a:rPr lang="en-US" smtClean="0"/>
               <a:pPr/>
-              <a:t>21</a:t>
+              <a:t>20</a:t>
             </a:fld>
             <a:endParaRPr lang="en-US"/>
           </a:p>
@@ -1662,7 +1881,7 @@
     </p:spTree>
     <p:extLst>
       <p:ext uri="{BB962C8B-B14F-4D97-AF65-F5344CB8AC3E}">
-        <p14:creationId xmlns:p14="http://schemas.microsoft.com/office/powerpoint/2010/main" val="2105287299"/>
+        <p14:creationId xmlns:p14="http://schemas.microsoft.com/office/powerpoint/2010/main" val="421144395"/>
       </p:ext>
     </p:extLst>
   </p:cSld>
@@ -1716,7 +1935,65 @@
           <a:bodyPr/>
           <a:lstStyle/>
           <a:p>
-            <a:endParaRPr lang="ro-RO" dirty="0"/>
+            <a:r>
+              <a:rPr lang="en-US" sz="1200" b="0" i="0" kern="1200" dirty="0" smtClean="0">
+                <a:solidFill>
+                  <a:schemeClr val="tx1"/>
+                </a:solidFill>
+                <a:effectLst/>
+                <a:latin typeface="+mn-lt"/>
+                <a:ea typeface="+mn-ea"/>
+                <a:cs typeface="+mn-cs"/>
+              </a:rPr>
+              <a:t>Multiple filters can be written and applied to the same URL pattern. The order of execution is determined by the ordering in the deployment descriptor. </a:t>
+            </a:r>
+          </a:p>
+          <a:p>
+            <a:r>
+              <a:rPr lang="en-US" sz="1200" b="0" i="0" kern="1200" dirty="0" smtClean="0">
+                <a:solidFill>
+                  <a:schemeClr val="tx1"/>
+                </a:solidFill>
+                <a:effectLst/>
+                <a:latin typeface="+mn-lt"/>
+                <a:ea typeface="+mn-ea"/>
+                <a:cs typeface="+mn-cs"/>
+              </a:rPr>
+              <a:t>Remember that in the </a:t>
+            </a:r>
+            <a:r>
+              <a:rPr lang="en-US" sz="1200" b="0" i="0" kern="1200" dirty="0" err="1" smtClean="0">
+                <a:solidFill>
+                  <a:schemeClr val="tx1"/>
+                </a:solidFill>
+                <a:effectLst/>
+                <a:latin typeface="+mn-lt"/>
+                <a:ea typeface="+mn-ea"/>
+                <a:cs typeface="+mn-cs"/>
+              </a:rPr>
+              <a:t>doFilter</a:t>
+            </a:r>
+            <a:r>
+              <a:rPr lang="en-US" sz="1200" b="0" i="0" kern="1200" dirty="0" smtClean="0">
+                <a:solidFill>
+                  <a:schemeClr val="tx1"/>
+                </a:solidFill>
+                <a:effectLst/>
+                <a:latin typeface="+mn-lt"/>
+                <a:ea typeface="+mn-ea"/>
+                <a:cs typeface="+mn-cs"/>
+              </a:rPr>
+              <a:t>() method you call the next element in the chain with: </a:t>
+            </a:r>
+            <a:r>
+              <a:rPr lang="en-US" dirty="0" err="1" smtClean="0"/>
+              <a:t>chain.doFilter</a:t>
+            </a:r>
+            <a:r>
+              <a:rPr lang="en-US" dirty="0" smtClean="0"/>
+              <a:t>(request, response);</a:t>
+            </a:r>
+            <a:endParaRPr lang="en-US" dirty="0"/>
           </a:p>
         </p:txBody>
       </p:sp>
@@ -1738,7 +2015,7 @@
             <a:fld id="{84377D70-F193-4353-836F-31B604DF4B77}" type="slidenum">
               <a:rPr lang="en-US" smtClean="0"/>
               <a:pPr/>
-              <a:t>23</a:t>
+              <a:t>21</a:t>
             </a:fld>
             <a:endParaRPr lang="en-US"/>
           </a:p>
@@ -1747,7 +2024,7 @@
     </p:spTree>
     <p:extLst>
       <p:ext uri="{BB962C8B-B14F-4D97-AF65-F5344CB8AC3E}">
-        <p14:creationId xmlns:p14="http://schemas.microsoft.com/office/powerpoint/2010/main" val="3194539832"/>
+        <p14:creationId xmlns:p14="http://schemas.microsoft.com/office/powerpoint/2010/main" val="2105287299"/>
       </p:ext>
     </p:extLst>
   </p:cSld>
@@ -8961,15 +9238,7 @@
           <a:p>
             <a:r>
               <a:rPr lang="en-US" sz="1600" b="1" dirty="0" smtClean="0"/>
-              <a:t>public void </a:t>
-            </a:r>
-            <a:r>
-              <a:rPr lang="en-US" sz="1600" b="1" dirty="0" err="1" smtClean="0"/>
-              <a:t>setAttribute</a:t>
-            </a:r>
-            <a:r>
-              <a:rPr lang="en-US" sz="1600" b="1" dirty="0" smtClean="0"/>
-              <a:t>(String name, Object o);</a:t>
+              <a:t>public void setAttribute(String name, Object o);</a:t>
             </a:r>
           </a:p>
           <a:p>
@@ -8994,12 +9263,8 @@
           <a:p>
             <a:pPr lvl="1"/>
             <a:r>
-              <a:rPr lang="en-US" sz="1600" b="1" dirty="0" err="1" smtClean="0"/>
-              <a:t>request.setAttribute</a:t>
-            </a:r>
-            <a:r>
               <a:rPr lang="en-US" sz="1600" b="1" dirty="0" smtClean="0"/>
-              <a:t>("</a:t>
+              <a:t>request.setAttribute("</a:t>
             </a:r>
             <a:r>
               <a:rPr lang="en-US" sz="1600" b="1" dirty="0" err="1" smtClean="0"/>
@@ -9035,6 +9300,10 @@
           </a:p>
           <a:p>
             <a:pPr lvl="1"/>
+            <a:r>
+              <a:rPr lang="en-US" sz="1600" b="1" dirty="0" smtClean="0"/>
+              <a:t>					</a:t>
+            </a:r>
             <a:r>
               <a:rPr lang="en-US" sz="1600" b="1" dirty="0" err="1" smtClean="0"/>
               <a:t>request.getRequestDispatcher</a:t>
@@ -12435,12 +12704,8 @@
           <a:lstStyle/>
           <a:p>
             <a:r>
-              <a:rPr lang="en-US" dirty="0" err="1" smtClean="0"/>
-              <a:t>Servlet</a:t>
-            </a:r>
-            <a:r>
               <a:rPr lang="en-US" dirty="0" smtClean="0"/>
-              <a:t> Filters </a:t>
+              <a:t>Servlet Filters </a:t>
             </a:r>
             <a:endParaRPr lang="ro-RO" dirty="0"/>
           </a:p>
@@ -12523,8 +12788,8 @@
               <a:t>Data compression </a:t>
             </a:r>
             <a:r>
-              <a:rPr lang="en-US" dirty="0" err="1" smtClean="0"/>
-              <a:t>Filtes</a:t>
+              <a:rPr lang="en-US" dirty="0" smtClean="0"/>
+              <a:t>Filters</a:t>
             </a:r>
             <a:endParaRPr lang="en-US" dirty="0" smtClean="0"/>
           </a:p>
@@ -26610,15 +26875,6 @@
 </file>
 
 <file path=customXml/item1.xml><?xml version="1.0" encoding="utf-8"?>
-<?mso-contentType ?>
-<FormTemplates xmlns="http://schemas.microsoft.com/sharepoint/v3/contenttype/forms">
-  <Display>DocumentLibraryForm</Display>
-  <Edit>DocumentLibraryForm</Edit>
-  <New>DocumentLibraryForm</New>
-</FormTemplates>
-</file>
-
-<file path=customXml/item2.xml><?xml version="1.0" encoding="utf-8"?>
 <ct:contentTypeSchema xmlns:ct="http://schemas.microsoft.com/office/2006/metadata/contentType" xmlns:ma="http://schemas.microsoft.com/office/2006/metadata/properties/metaAttributes" ct:_="" ma:_="" ma:contentTypeName="Document" ma:contentTypeID="0x0101002EAB9993CCBF73478E12853278F3FB5C" ma:contentTypeVersion="1" ma:contentTypeDescription="Create a new document." ma:contentTypeScope="" ma:versionID="4db10d317033d09fed4d0297d17c663a">
   <xsd:schema xmlns:xsd="http://www.w3.org/2001/XMLSchema" xmlns:xs="http://www.w3.org/2001/XMLSchema" xmlns:p="http://schemas.microsoft.com/office/2006/metadata/properties" xmlns:ns1="http://schemas.microsoft.com/sharepoint/v3" targetNamespace="http://schemas.microsoft.com/office/2006/metadata/properties" ma:root="true" ma:fieldsID="48c5b5cd9b8d25ff6dd15848836f4270" ns1:_="">
     <xsd:import namespace="http://schemas.microsoft.com/sharepoint/v3"/>
@@ -26750,6 +27006,15 @@
 </ct:contentTypeSchema>
 </file>
 
+<file path=customXml/item2.xml><?xml version="1.0" encoding="utf-8"?>
+<?mso-contentType ?>
+<FormTemplates xmlns="http://schemas.microsoft.com/sharepoint/v3/contenttype/forms">
+  <Display>DocumentLibraryForm</Display>
+  <Edit>DocumentLibraryForm</Edit>
+  <New>DocumentLibraryForm</New>
+</FormTemplates>
+</file>
+
 <file path=customXml/item3.xml><?xml version="1.0" encoding="utf-8"?>
 <p:properties xmlns:p="http://schemas.microsoft.com/office/2006/metadata/properties" xmlns:xsi="http://www.w3.org/2001/XMLSchema-instance" xmlns:pc="http://schemas.microsoft.com/office/infopath/2007/PartnerControls">
   <documentManagement>
@@ -26760,14 +27025,6 @@
 </file>
 
 <file path=customXml/itemProps1.xml><?xml version="1.0" encoding="utf-8"?>
-<ds:datastoreItem xmlns:ds="http://schemas.openxmlformats.org/officeDocument/2006/customXml" ds:itemID="{B3E8851E-A513-4DE1-BFEA-60B7444A3522}">
-  <ds:schemaRefs>
-    <ds:schemaRef ds:uri="http://schemas.microsoft.com/sharepoint/v3/contenttype/forms"/>
-  </ds:schemaRefs>
-</ds:datastoreItem>
-</file>
-
-<file path=customXml/itemProps2.xml><?xml version="1.0" encoding="utf-8"?>
 <ds:datastoreItem xmlns:ds="http://schemas.openxmlformats.org/officeDocument/2006/customXml" ds:itemID="{E29AC310-E4D3-4181-8DC8-8BCBD631C9E0}">
   <ds:schemaRefs>
     <ds:schemaRef ds:uri="http://schemas.microsoft.com/office/2006/metadata/contentType"/>
@@ -26781,6 +27038,14 @@
     <ds:schemaRef ds:uri="http://purl.org/dc/elements/1.1/"/>
     <ds:schemaRef ds:uri="http://purl.org/dc/terms/"/>
     <ds:schemaRef ds:uri="http://schemas.microsoft.com/internal/obd"/>
+  </ds:schemaRefs>
+</ds:datastoreItem>
+</file>
+
+<file path=customXml/itemProps2.xml><?xml version="1.0" encoding="utf-8"?>
+<ds:datastoreItem xmlns:ds="http://schemas.openxmlformats.org/officeDocument/2006/customXml" ds:itemID="{B3E8851E-A513-4DE1-BFEA-60B7444A3522}">
+  <ds:schemaRefs>
+    <ds:schemaRef ds:uri="http://schemas.microsoft.com/sharepoint/v3/contenttype/forms"/>
   </ds:schemaRefs>
 </ds:datastoreItem>
 </file>

</xml_diff>

<commit_message>
add http session slide.
</commit_message>
<xml_diff>
--- a/Servlets/Web Presentation-Part2.pptx
+++ b/Servlets/Web Presentation-Part2.pptx
@@ -5,7 +5,7 @@
     <p:sldMasterId id="2147483648" r:id="rId4"/>
   </p:sldMasterIdLst>
   <p:notesMasterIdLst>
-    <p:notesMasterId r:id="rId32"/>
+    <p:notesMasterId r:id="rId33"/>
   </p:notesMasterIdLst>
   <p:sldIdLst>
     <p:sldId id="256" r:id="rId5"/>
@@ -34,7 +34,8 @@
     <p:sldId id="310" r:id="rId28"/>
     <p:sldId id="331" r:id="rId29"/>
     <p:sldId id="332" r:id="rId30"/>
-    <p:sldId id="334" r:id="rId31"/>
+    <p:sldId id="335" r:id="rId31"/>
+    <p:sldId id="334" r:id="rId32"/>
   </p:sldIdLst>
   <p:sldSz cx="9144000" cy="6858000" type="screen4x3"/>
   <p:notesSz cx="6858000" cy="9144000"/>
@@ -848,7 +849,153 @@
           <a:bodyPr/>
           <a:lstStyle/>
           <a:p>
-            <a:endParaRPr lang="ro-RO" dirty="0"/>
+            <a:pPr marL="228600" indent="-228600">
+              <a:buAutoNum type="arabicPeriod"/>
+            </a:pPr>
+            <a:r>
+              <a:rPr lang="en-US" sz="1200" b="1" i="0" kern="1200" dirty="0" smtClean="0">
+                <a:solidFill>
+                  <a:schemeClr val="tx1"/>
+                </a:solidFill>
+                <a:effectLst/>
+                <a:latin typeface="+mn-lt"/>
+                <a:ea typeface="+mn-ea"/>
+                <a:cs typeface="+mn-cs"/>
+              </a:rPr>
+              <a:t>Cookies</a:t>
+            </a:r>
+            <a:r>
+              <a:rPr lang="en-US" sz="1200" b="0" i="0" kern="1200" dirty="0" smtClean="0">
+                <a:solidFill>
+                  <a:schemeClr val="tx1"/>
+                </a:solidFill>
+                <a:effectLst/>
+                <a:latin typeface="+mn-lt"/>
+                <a:ea typeface="+mn-ea"/>
+                <a:cs typeface="+mn-cs"/>
+              </a:rPr>
+              <a:t> are small piece of information that is sent by web server in response header and gets stored in the browser cookies. When client make further request, it adds the cookie to the request header and we can utilize it to keep track of the session.</a:t>
+            </a:r>
+          </a:p>
+          <a:p>
+            <a:pPr marL="228600" marR="0" indent="-228600" algn="l" defTabSz="914400" rtl="0" eaLnBrk="1" fontAlgn="auto" latinLnBrk="0" hangingPunct="1">
+              <a:lnSpc>
+                <a:spcPct val="100000"/>
+              </a:lnSpc>
+              <a:spcBef>
+                <a:spcPts val="0"/>
+              </a:spcBef>
+              <a:spcAft>
+                <a:spcPts val="0"/>
+              </a:spcAft>
+              <a:buClrTx/>
+              <a:buSzTx/>
+              <a:buFontTx/>
+              <a:buAutoNum type="arabicPeriod"/>
+              <a:tabLst/>
+              <a:defRPr/>
+            </a:pPr>
+            <a:r>
+              <a:rPr lang="en-US" sz="1200" b="1" i="0" kern="1200" dirty="0" smtClean="0">
+                <a:solidFill>
+                  <a:schemeClr val="tx1"/>
+                </a:solidFill>
+                <a:effectLst/>
+                <a:latin typeface="+mn-lt"/>
+                <a:ea typeface="+mn-ea"/>
+                <a:cs typeface="+mn-cs"/>
+              </a:rPr>
+              <a:t>URL Rewriting</a:t>
+            </a:r>
+            <a:r>
+              <a:rPr lang="en-US" sz="1200" b="0" i="0" kern="1200" dirty="0" smtClean="0">
+                <a:solidFill>
+                  <a:schemeClr val="tx1"/>
+                </a:solidFill>
+                <a:effectLst/>
+                <a:latin typeface="+mn-lt"/>
+                <a:ea typeface="+mn-ea"/>
+                <a:cs typeface="+mn-cs"/>
+              </a:rPr>
+              <a:t> – We can append a session identifier parameter with every request and response to keep track of the session. This is very tedious because we need to keep track of this parameter in every response and make sure it’s not clashing with other parameters.</a:t>
+            </a:r>
+          </a:p>
+          <a:p>
+            <a:pPr marL="228600" marR="0" indent="-228600" algn="l" defTabSz="914400" rtl="0" eaLnBrk="1" fontAlgn="auto" latinLnBrk="0" hangingPunct="1">
+              <a:lnSpc>
+                <a:spcPct val="100000"/>
+              </a:lnSpc>
+              <a:spcBef>
+                <a:spcPts val="0"/>
+              </a:spcBef>
+              <a:spcAft>
+                <a:spcPts val="0"/>
+              </a:spcAft>
+              <a:buClrTx/>
+              <a:buSzTx/>
+              <a:buFontTx/>
+              <a:buAutoNum type="arabicPeriod"/>
+              <a:tabLst/>
+              <a:defRPr/>
+            </a:pPr>
+            <a:r>
+              <a:rPr lang="en-US" sz="1200" b="1" i="0" kern="1200" dirty="0" smtClean="0">
+                <a:solidFill>
+                  <a:schemeClr val="tx1"/>
+                </a:solidFill>
+                <a:effectLst/>
+                <a:latin typeface="+mn-lt"/>
+                <a:ea typeface="+mn-ea"/>
+                <a:cs typeface="+mn-cs"/>
+              </a:rPr>
+              <a:t>HTML Hidden Field</a:t>
+            </a:r>
+            <a:r>
+              <a:rPr lang="en-US" sz="1200" b="0" i="0" kern="1200" dirty="0" smtClean="0">
+                <a:solidFill>
+                  <a:schemeClr val="tx1"/>
+                </a:solidFill>
+                <a:effectLst/>
+                <a:latin typeface="+mn-lt"/>
+                <a:ea typeface="+mn-ea"/>
+                <a:cs typeface="+mn-cs"/>
+              </a:rPr>
+              <a:t> – We can create a unique hidden field in the HTML and when user starts navigating, we can set its value unique to the user and keep track of the session. This method can’t be used with links because it needs the form to be submitted every time request is made from client to server with the hidden field. Also it’s not secure because we can get the hidden field value from the HTML source and use it to hack the session.</a:t>
+            </a:r>
+          </a:p>
+          <a:p>
+            <a:pPr marL="228600" marR="0" indent="-228600" algn="l" defTabSz="914400" rtl="0" eaLnBrk="1" fontAlgn="auto" latinLnBrk="0" hangingPunct="1">
+              <a:lnSpc>
+                <a:spcPct val="100000"/>
+              </a:lnSpc>
+              <a:spcBef>
+                <a:spcPts val="0"/>
+              </a:spcBef>
+              <a:spcAft>
+                <a:spcPts val="0"/>
+              </a:spcAft>
+              <a:buClrTx/>
+              <a:buSzTx/>
+              <a:buFontTx/>
+              <a:buAutoNum type="arabicPeriod"/>
+              <a:tabLst/>
+              <a:defRPr/>
+            </a:pPr>
+            <a:endParaRPr lang="en-US" sz="1200" b="0" i="0" kern="1200" dirty="0" smtClean="0">
+              <a:solidFill>
+                <a:schemeClr val="tx1"/>
+              </a:solidFill>
+              <a:effectLst/>
+              <a:latin typeface="+mn-lt"/>
+              <a:ea typeface="+mn-ea"/>
+              <a:cs typeface="+mn-cs"/>
+            </a:endParaRPr>
+          </a:p>
+          <a:p>
+            <a:pPr marL="228600" indent="-228600">
+              <a:buAutoNum type="arabicPeriod"/>
+            </a:pPr>
+            <a:endParaRPr lang="en-US" dirty="0"/>
           </a:p>
         </p:txBody>
       </p:sp>
@@ -870,7 +1017,92 @@
             <a:fld id="{84377D70-F193-4353-836F-31B604DF4B77}" type="slidenum">
               <a:rPr lang="en-US" smtClean="0"/>
               <a:pPr/>
-              <a:t>27</a:t>
+              <a:t>25</a:t>
+            </a:fld>
+            <a:endParaRPr lang="en-US"/>
+          </a:p>
+        </p:txBody>
+      </p:sp>
+    </p:spTree>
+    <p:extLst>
+      <p:ext uri="{BB962C8B-B14F-4D97-AF65-F5344CB8AC3E}">
+        <p14:creationId xmlns:p14="http://schemas.microsoft.com/office/powerpoint/2010/main" val="3596594324"/>
+      </p:ext>
+    </p:extLst>
+  </p:cSld>
+  <p:clrMapOvr>
+    <a:masterClrMapping/>
+  </p:clrMapOvr>
+</p:notes>
+</file>
+
+<file path=ppt/notesSlides/notesSlide13.xml><?xml version="1.0" encoding="utf-8"?>
+<p:notes xmlns:a="http://schemas.openxmlformats.org/drawingml/2006/main" xmlns:r="http://schemas.openxmlformats.org/officeDocument/2006/relationships" xmlns:p="http://schemas.openxmlformats.org/presentationml/2006/main">
+  <p:cSld>
+    <p:spTree>
+      <p:nvGrpSpPr>
+        <p:cNvPr id="1" name=""/>
+        <p:cNvGrpSpPr/>
+        <p:nvPr/>
+      </p:nvGrpSpPr>
+      <p:grpSpPr>
+        <a:xfrm>
+          <a:off x="0" y="0"/>
+          <a:ext cx="0" cy="0"/>
+          <a:chOff x="0" y="0"/>
+          <a:chExt cx="0" cy="0"/>
+        </a:xfrm>
+      </p:grpSpPr>
+      <p:sp>
+        <p:nvSpPr>
+          <p:cNvPr id="2" name="Slide Image Placeholder 1"/>
+          <p:cNvSpPr>
+            <a:spLocks noGrp="1" noRot="1" noChangeAspect="1"/>
+          </p:cNvSpPr>
+          <p:nvPr>
+            <p:ph type="sldImg"/>
+          </p:nvPr>
+        </p:nvSpPr>
+        <p:spPr/>
+      </p:sp>
+      <p:sp>
+        <p:nvSpPr>
+          <p:cNvPr id="3" name="Notes Placeholder 2"/>
+          <p:cNvSpPr>
+            <a:spLocks noGrp="1"/>
+          </p:cNvSpPr>
+          <p:nvPr>
+            <p:ph type="body" idx="1"/>
+          </p:nvPr>
+        </p:nvSpPr>
+        <p:spPr/>
+        <p:txBody>
+          <a:bodyPr/>
+          <a:lstStyle/>
+          <a:p>
+            <a:endParaRPr lang="ro-RO" dirty="0"/>
+          </a:p>
+        </p:txBody>
+      </p:sp>
+      <p:sp>
+        <p:nvSpPr>
+          <p:cNvPr id="4" name="Slide Number Placeholder 3"/>
+          <p:cNvSpPr>
+            <a:spLocks noGrp="1"/>
+          </p:cNvSpPr>
+          <p:nvPr>
+            <p:ph type="sldNum" sz="quarter" idx="10"/>
+          </p:nvPr>
+        </p:nvSpPr>
+        <p:spPr/>
+        <p:txBody>
+          <a:bodyPr/>
+          <a:lstStyle/>
+          <a:p>
+            <a:fld id="{84377D70-F193-4353-836F-31B604DF4B77}" type="slidenum">
+              <a:rPr lang="en-US" smtClean="0"/>
+              <a:pPr/>
+              <a:t>28</a:t>
             </a:fld>
             <a:endParaRPr lang="en-US"/>
           </a:p>
@@ -17089,7 +17321,7 @@
           <p:nvPr/>
         </p:nvPicPr>
         <p:blipFill>
-          <a:blip r:embed="rId2">
+          <a:blip r:embed="rId3">
             <a:extLst>
               <a:ext uri="{28A0092B-C50C-407E-A947-70E740481C1C}">
                 <a14:useLocalDpi xmlns:a14="http://schemas.microsoft.com/office/drawing/2010/main" val="0"/>
@@ -17119,7 +17351,7 @@
           <p:nvPr/>
         </p:nvPicPr>
         <p:blipFill>
-          <a:blip r:embed="rId3"/>
+          <a:blip r:embed="rId4"/>
           <a:srcRect/>
           <a:stretch>
             <a:fillRect/>
@@ -17739,6 +17971,503 @@
         </p:nvSpPr>
         <p:spPr>
           <a:xfrm>
+            <a:off x="2870377" y="6881766"/>
+            <a:ext cx="8062031" cy="5349745"/>
+          </a:xfrm>
+        </p:spPr>
+        <p:txBody>
+          <a:bodyPr>
+            <a:normAutofit/>
+          </a:bodyPr>
+          <a:lstStyle/>
+          <a:p>
+            <a:pPr algn="l"/>
+            <a:endParaRPr lang="en-US" dirty="0" smtClean="0"/>
+          </a:p>
+          <a:p>
+            <a:pPr algn="l"/>
+            <a:endParaRPr lang="en-US" dirty="0" smtClean="0"/>
+          </a:p>
+          <a:p>
+            <a:pPr algn="l"/>
+            <a:endParaRPr lang="en-US" dirty="0"/>
+          </a:p>
+          <a:p>
+            <a:pPr algn="l"/>
+            <a:endParaRPr lang="en-US" dirty="0"/>
+          </a:p>
+          <a:p>
+            <a:pPr algn="l"/>
+            <a:endParaRPr lang="en-US" dirty="0"/>
+          </a:p>
+          <a:p>
+            <a:pPr lvl="2" algn="l"/>
+            <a:endParaRPr lang="en-US" sz="1800" dirty="0"/>
+          </a:p>
+          <a:p>
+            <a:pPr lvl="1"/>
+            <a:endParaRPr lang="en-US" sz="1800" dirty="0"/>
+          </a:p>
+          <a:p>
+            <a:pPr lvl="1"/>
+            <a:endParaRPr lang="en-US" b="1" dirty="0" smtClean="0"/>
+          </a:p>
+          <a:p>
+            <a:pPr lvl="1"/>
+            <a:endParaRPr lang="en-US" b="1" dirty="0" smtClean="0"/>
+          </a:p>
+          <a:p>
+            <a:pPr lvl="1"/>
+            <a:endParaRPr lang="en-US" b="1" dirty="0" smtClean="0"/>
+          </a:p>
+          <a:p>
+            <a:pPr lvl="1"/>
+            <a:endParaRPr lang="en-US" b="1" dirty="0" smtClean="0"/>
+          </a:p>
+          <a:p>
+            <a:pPr lvl="1"/>
+            <a:endParaRPr lang="en-US" b="1" dirty="0" smtClean="0"/>
+          </a:p>
+          <a:p>
+            <a:pPr lvl="1"/>
+            <a:endParaRPr lang="en-US" b="1" dirty="0" smtClean="0"/>
+          </a:p>
+          <a:p>
+            <a:pPr lvl="1"/>
+            <a:endParaRPr lang="en-US" b="1" dirty="0" smtClean="0"/>
+          </a:p>
+          <a:p>
+            <a:pPr lvl="1"/>
+            <a:endParaRPr lang="en-US" b="1" dirty="0" smtClean="0"/>
+          </a:p>
+          <a:p>
+            <a:pPr lvl="1"/>
+            <a:endParaRPr lang="en-US" b="1" dirty="0" smtClean="0"/>
+          </a:p>
+          <a:p>
+            <a:pPr lvl="1"/>
+            <a:endParaRPr lang="en-US" dirty="0" smtClean="0"/>
+          </a:p>
+          <a:p>
+            <a:endParaRPr lang="en-US" dirty="0"/>
+          </a:p>
+          <a:p>
+            <a:endParaRPr lang="ro-RO" dirty="0"/>
+          </a:p>
+        </p:txBody>
+      </p:sp>
+      <p:pic>
+        <p:nvPicPr>
+          <p:cNvPr id="9" name="Picture 8"/>
+          <p:cNvPicPr>
+            <a:picLocks noChangeAspect="1"/>
+          </p:cNvPicPr>
+          <p:nvPr/>
+        </p:nvPicPr>
+        <p:blipFill>
+          <a:blip r:embed="rId2">
+            <a:extLst>
+              <a:ext uri="{28A0092B-C50C-407E-A947-70E740481C1C}">
+                <a14:useLocalDpi xmlns:a14="http://schemas.microsoft.com/office/drawing/2010/main" val="0"/>
+              </a:ext>
+            </a:extLst>
+          </a:blip>
+          <a:stretch>
+            <a:fillRect/>
+          </a:stretch>
+        </p:blipFill>
+        <p:spPr>
+          <a:xfrm>
+            <a:off x="7234238" y="401384"/>
+            <a:ext cx="1190625" cy="1323975"/>
+          </a:xfrm>
+          <a:prstGeom prst="rect">
+            <a:avLst/>
+          </a:prstGeom>
+        </p:spPr>
+      </p:pic>
+      <p:sp>
+        <p:nvSpPr>
+          <p:cNvPr id="4" name="Rectangle 3"/>
+          <p:cNvSpPr/>
+          <p:nvPr/>
+        </p:nvSpPr>
+        <p:spPr>
+          <a:xfrm>
+            <a:off x="620889" y="1725360"/>
+            <a:ext cx="7687733" cy="2327352"/>
+          </a:xfrm>
+          <a:prstGeom prst="rect">
+            <a:avLst/>
+          </a:prstGeom>
+        </p:spPr>
+        <p:txBody>
+          <a:bodyPr wrap="square">
+            <a:spAutoFit/>
+          </a:bodyPr>
+          <a:lstStyle/>
+          <a:p>
+            <a:r>
+              <a:rPr lang="en-US" dirty="0">
+                <a:solidFill>
+                  <a:srgbClr val="565A5C"/>
+                </a:solidFill>
+                <a:latin typeface="Arial"/>
+                <a:cs typeface="Arial"/>
+              </a:rPr>
+              <a:t>The</a:t>
+            </a:r>
+            <a:r>
+              <a:rPr lang="en-US" dirty="0">
+                <a:solidFill>
+                  <a:srgbClr val="000000"/>
+                </a:solidFill>
+                <a:latin typeface="verdana" panose="020B0604030504040204" pitchFamily="34" charset="0"/>
+              </a:rPr>
+              <a:t> </a:t>
+            </a:r>
+            <a:r>
+              <a:rPr lang="en-US" dirty="0" err="1">
+                <a:solidFill>
+                  <a:srgbClr val="565A5C"/>
+                </a:solidFill>
+                <a:latin typeface="Arial"/>
+                <a:cs typeface="Arial"/>
+              </a:rPr>
+              <a:t>HttpServletRequest</a:t>
+            </a:r>
+            <a:r>
+              <a:rPr lang="en-US" dirty="0">
+                <a:solidFill>
+                  <a:srgbClr val="000000"/>
+                </a:solidFill>
+                <a:latin typeface="verdana" panose="020B0604030504040204" pitchFamily="34" charset="0"/>
+              </a:rPr>
+              <a:t> </a:t>
+            </a:r>
+            <a:r>
+              <a:rPr lang="en-US" dirty="0">
+                <a:solidFill>
+                  <a:srgbClr val="565A5C"/>
+                </a:solidFill>
+                <a:latin typeface="Arial"/>
+                <a:cs typeface="Arial"/>
+              </a:rPr>
+              <a:t>interface provides two methods to get the object of </a:t>
+            </a:r>
+            <a:r>
+              <a:rPr lang="en-US" dirty="0" err="1">
+                <a:solidFill>
+                  <a:srgbClr val="565A5C"/>
+                </a:solidFill>
+                <a:latin typeface="Arial"/>
+                <a:cs typeface="Arial"/>
+              </a:rPr>
+              <a:t>HttpSession</a:t>
+            </a:r>
+            <a:r>
+              <a:rPr lang="en-US" dirty="0">
+                <a:solidFill>
+                  <a:srgbClr val="565A5C"/>
+                </a:solidFill>
+                <a:latin typeface="Arial"/>
+                <a:cs typeface="Arial"/>
+              </a:rPr>
+              <a:t>:</a:t>
+            </a:r>
+          </a:p>
+          <a:p>
+            <a:pPr>
+              <a:buFont typeface="+mj-lt"/>
+              <a:buAutoNum type="arabicPeriod"/>
+            </a:pPr>
+            <a:r>
+              <a:rPr lang="en-US" dirty="0">
+                <a:solidFill>
+                  <a:srgbClr val="565A5C"/>
+                </a:solidFill>
+                <a:latin typeface="Arial"/>
+                <a:cs typeface="Arial"/>
+              </a:rPr>
+              <a:t> public </a:t>
+            </a:r>
+            <a:r>
+              <a:rPr lang="en-US" dirty="0" err="1">
+                <a:solidFill>
+                  <a:srgbClr val="565A5C"/>
+                </a:solidFill>
+                <a:latin typeface="Arial"/>
+                <a:cs typeface="Arial"/>
+              </a:rPr>
+              <a:t>HttpSession</a:t>
+            </a:r>
+            <a:r>
+              <a:rPr lang="en-US" dirty="0">
+                <a:solidFill>
+                  <a:srgbClr val="565A5C"/>
+                </a:solidFill>
+                <a:latin typeface="Arial"/>
+                <a:cs typeface="Arial"/>
+              </a:rPr>
+              <a:t> </a:t>
+            </a:r>
+            <a:r>
+              <a:rPr lang="en-US" b="1" dirty="0" err="1">
+                <a:solidFill>
+                  <a:srgbClr val="565A5C"/>
+                </a:solidFill>
+                <a:latin typeface="Arial"/>
+                <a:cs typeface="Arial"/>
+              </a:rPr>
+              <a:t>getSession</a:t>
+            </a:r>
+            <a:r>
+              <a:rPr lang="en-US" b="1" dirty="0">
+                <a:solidFill>
+                  <a:srgbClr val="565A5C"/>
+                </a:solidFill>
+                <a:latin typeface="Arial"/>
+                <a:cs typeface="Arial"/>
+              </a:rPr>
+              <a:t>()</a:t>
+            </a:r>
+            <a:r>
+              <a:rPr lang="en-US" dirty="0">
+                <a:solidFill>
+                  <a:srgbClr val="565A5C"/>
+                </a:solidFill>
+                <a:latin typeface="Arial"/>
+                <a:cs typeface="Arial"/>
+              </a:rPr>
+              <a:t>:Returns the current session associated with this request, or if the request does not have a session, creates one.</a:t>
+            </a:r>
+          </a:p>
+          <a:p>
+            <a:pPr>
+              <a:buFont typeface="+mj-lt"/>
+              <a:buAutoNum type="arabicPeriod"/>
+            </a:pPr>
+            <a:r>
+              <a:rPr lang="en-US" dirty="0">
+                <a:solidFill>
+                  <a:srgbClr val="565A5C"/>
+                </a:solidFill>
+                <a:latin typeface="Arial"/>
+                <a:cs typeface="Arial"/>
+              </a:rPr>
+              <a:t> public </a:t>
+            </a:r>
+            <a:r>
+              <a:rPr lang="en-US" dirty="0" err="1">
+                <a:solidFill>
+                  <a:srgbClr val="565A5C"/>
+                </a:solidFill>
+                <a:latin typeface="Arial"/>
+                <a:cs typeface="Arial"/>
+              </a:rPr>
+              <a:t>HttpSession</a:t>
+            </a:r>
+            <a:r>
+              <a:rPr lang="en-US" dirty="0">
+                <a:solidFill>
+                  <a:srgbClr val="565A5C"/>
+                </a:solidFill>
+                <a:latin typeface="Arial"/>
+                <a:cs typeface="Arial"/>
+              </a:rPr>
+              <a:t> </a:t>
+            </a:r>
+            <a:r>
+              <a:rPr lang="en-US" b="1" dirty="0" err="1">
+                <a:solidFill>
+                  <a:srgbClr val="565A5C"/>
+                </a:solidFill>
+                <a:latin typeface="Arial"/>
+                <a:cs typeface="Arial"/>
+              </a:rPr>
+              <a:t>getSession</a:t>
+            </a:r>
+            <a:r>
+              <a:rPr lang="en-US" b="1" dirty="0">
+                <a:solidFill>
+                  <a:srgbClr val="565A5C"/>
+                </a:solidFill>
+                <a:latin typeface="Arial"/>
+                <a:cs typeface="Arial"/>
+              </a:rPr>
+              <a:t>(</a:t>
+            </a:r>
+            <a:r>
+              <a:rPr lang="en-US" b="1" dirty="0" err="1">
+                <a:solidFill>
+                  <a:srgbClr val="565A5C"/>
+                </a:solidFill>
+                <a:latin typeface="Arial"/>
+                <a:cs typeface="Arial"/>
+              </a:rPr>
+              <a:t>boolean</a:t>
+            </a:r>
+            <a:r>
+              <a:rPr lang="en-US" b="1" dirty="0">
+                <a:solidFill>
+                  <a:srgbClr val="565A5C"/>
+                </a:solidFill>
+                <a:latin typeface="Arial"/>
+                <a:cs typeface="Arial"/>
+              </a:rPr>
+              <a:t> create)</a:t>
+            </a:r>
+            <a:r>
+              <a:rPr lang="en-US" dirty="0">
+                <a:solidFill>
+                  <a:srgbClr val="565A5C"/>
+                </a:solidFill>
+                <a:latin typeface="Arial"/>
+                <a:cs typeface="Arial"/>
+              </a:rPr>
+              <a:t>:Returns the current </a:t>
+            </a:r>
+            <a:r>
+              <a:rPr lang="en-US" dirty="0" err="1">
+                <a:solidFill>
+                  <a:srgbClr val="565A5C"/>
+                </a:solidFill>
+                <a:latin typeface="Arial"/>
+                <a:cs typeface="Arial"/>
+              </a:rPr>
+              <a:t>HttpSession</a:t>
+            </a:r>
+            <a:r>
+              <a:rPr lang="en-US" dirty="0">
+                <a:solidFill>
+                  <a:srgbClr val="565A5C"/>
+                </a:solidFill>
+                <a:latin typeface="Arial"/>
+                <a:cs typeface="Arial"/>
+              </a:rPr>
+              <a:t> associated with this request or, if there is no current session and create is true, returns a new session.</a:t>
+            </a:r>
+          </a:p>
+        </p:txBody>
+      </p:sp>
+      <p:pic>
+        <p:nvPicPr>
+          <p:cNvPr id="1026" name="Picture 2" descr="HttpSession object"/>
+          <p:cNvPicPr>
+            <a:picLocks noChangeAspect="1" noChangeArrowheads="1"/>
+          </p:cNvPicPr>
+          <p:nvPr/>
+        </p:nvPicPr>
+        <p:blipFill>
+          <a:blip r:embed="rId3">
+            <a:extLst>
+              <a:ext uri="{28A0092B-C50C-407E-A947-70E740481C1C}">
+                <a14:useLocalDpi xmlns:a14="http://schemas.microsoft.com/office/drawing/2010/main" val="0"/>
+              </a:ext>
+            </a:extLst>
+          </a:blip>
+          <a:srcRect/>
+          <a:stretch>
+            <a:fillRect/>
+          </a:stretch>
+        </p:blipFill>
+        <p:spPr bwMode="auto">
+          <a:xfrm>
+            <a:off x="2529240" y="3939822"/>
+            <a:ext cx="6282981" cy="2714009"/>
+          </a:xfrm>
+          <a:prstGeom prst="rect">
+            <a:avLst/>
+          </a:prstGeom>
+          <a:noFill/>
+          <a:extLst>
+            <a:ext uri="{909E8E84-426E-40DD-AFC4-6F175D3DCCD1}">
+              <a14:hiddenFill xmlns:a14="http://schemas.microsoft.com/office/drawing/2010/main">
+                <a:solidFill>
+                  <a:srgbClr val="FFFFFF"/>
+                </a:solidFill>
+              </a14:hiddenFill>
+            </a:ext>
+          </a:extLst>
+        </p:spPr>
+      </p:pic>
+    </p:spTree>
+    <p:extLst>
+      <p:ext uri="{BB962C8B-B14F-4D97-AF65-F5344CB8AC3E}">
+        <p14:creationId xmlns:p14="http://schemas.microsoft.com/office/powerpoint/2010/main" val="1420359912"/>
+      </p:ext>
+    </p:extLst>
+  </p:cSld>
+  <p:clrMapOvr>
+    <a:masterClrMapping/>
+  </p:clrMapOvr>
+  <p:timing>
+    <p:tnLst>
+      <p:par>
+        <p:cTn id="1" dur="indefinite" restart="never" nodeType="tmRoot"/>
+      </p:par>
+    </p:tnLst>
+  </p:timing>
+</p:sld>
+</file>
+
+<file path=ppt/slides/slide27.xml><?xml version="1.0" encoding="utf-8"?>
+<p:sld xmlns:a="http://schemas.openxmlformats.org/drawingml/2006/main" xmlns:r="http://schemas.openxmlformats.org/officeDocument/2006/relationships" xmlns:p="http://schemas.openxmlformats.org/presentationml/2006/main">
+  <p:cSld>
+    <p:spTree>
+      <p:nvGrpSpPr>
+        <p:cNvPr id="1" name=""/>
+        <p:cNvGrpSpPr/>
+        <p:nvPr/>
+      </p:nvGrpSpPr>
+      <p:grpSpPr>
+        <a:xfrm>
+          <a:off x="0" y="0"/>
+          <a:ext cx="0" cy="0"/>
+          <a:chOff x="0" y="0"/>
+          <a:chExt cx="0" cy="0"/>
+        </a:xfrm>
+      </p:grpSpPr>
+      <p:sp>
+        <p:nvSpPr>
+          <p:cNvPr id="2" name="Title 1"/>
+          <p:cNvSpPr>
+            <a:spLocks noGrp="1"/>
+          </p:cNvSpPr>
+          <p:nvPr>
+            <p:ph type="title"/>
+          </p:nvPr>
+        </p:nvSpPr>
+        <p:spPr>
+          <a:xfrm>
+            <a:off x="999511" y="766826"/>
+            <a:ext cx="3245112" cy="593092"/>
+          </a:xfrm>
+        </p:spPr>
+        <p:txBody>
+          <a:bodyPr/>
+          <a:lstStyle/>
+          <a:p>
+            <a:r>
+              <a:rPr lang="en-US" dirty="0" smtClean="0"/>
+              <a:t>HTTP Session</a:t>
+            </a:r>
+            <a:endParaRPr lang="ro-RO" dirty="0"/>
+          </a:p>
+        </p:txBody>
+      </p:sp>
+      <p:sp>
+        <p:nvSpPr>
+          <p:cNvPr id="3" name="Content Placeholder 2"/>
+          <p:cNvSpPr>
+            <a:spLocks noGrp="1"/>
+          </p:cNvSpPr>
+          <p:nvPr>
+            <p:ph idx="1"/>
+          </p:nvPr>
+        </p:nvSpPr>
+        <p:spPr>
+          <a:xfrm>
             <a:off x="720724" y="1635048"/>
             <a:ext cx="8062031" cy="5349745"/>
           </a:xfrm>
@@ -18078,7 +18807,7 @@
     </p:spTree>
     <p:extLst>
       <p:ext uri="{BB962C8B-B14F-4D97-AF65-F5344CB8AC3E}">
-        <p14:creationId xmlns:p14="http://schemas.microsoft.com/office/powerpoint/2010/main" val="1420359912"/>
+        <p14:creationId xmlns:p14="http://schemas.microsoft.com/office/powerpoint/2010/main" val="2291593969"/>
       </p:ext>
     </p:extLst>
   </p:cSld>
@@ -19130,7 +19859,7 @@
 </p:sld>
 </file>
 
-<file path=ppt/slides/slide27.xml><?xml version="1.0" encoding="utf-8"?>
+<file path=ppt/slides/slide28.xml><?xml version="1.0" encoding="utf-8"?>
 <p:sld xmlns:a="http://schemas.openxmlformats.org/drawingml/2006/main" xmlns:r="http://schemas.openxmlformats.org/officeDocument/2006/relationships" xmlns:p="http://schemas.openxmlformats.org/presentationml/2006/main">
   <p:cSld>
     <p:spTree>

</xml_diff>